<commit_message>
Updated ECCC PPT and some minor code fixes
</commit_message>
<xml_diff>
--- a/Docs/Vortex ECCC 2013.pptx
+++ b/Docs/Vortex ECCC 2013.pptx
@@ -8,11 +8,15 @@
     <p:sldId id="256" r:id="rId2"/>
     <p:sldId id="259" r:id="rId3"/>
     <p:sldId id="261" r:id="rId4"/>
-    <p:sldId id="257" r:id="rId5"/>
-    <p:sldId id="260" r:id="rId6"/>
-    <p:sldId id="262" r:id="rId7"/>
-    <p:sldId id="263" r:id="rId8"/>
-    <p:sldId id="258" r:id="rId9"/>
+    <p:sldId id="264" r:id="rId5"/>
+    <p:sldId id="257" r:id="rId6"/>
+    <p:sldId id="260" r:id="rId7"/>
+    <p:sldId id="267" r:id="rId8"/>
+    <p:sldId id="265" r:id="rId9"/>
+    <p:sldId id="263" r:id="rId10"/>
+    <p:sldId id="262" r:id="rId11"/>
+    <p:sldId id="258" r:id="rId12"/>
+    <p:sldId id="266" r:id="rId13"/>
   </p:sldIdLst>
   <p:sldSz cx="9144000" cy="6858000" type="screen4x3"/>
   <p:notesSz cx="6858000" cy="9144000"/>
@@ -350,7 +354,7 @@
           <a:p>
             <a:fld id="{7E8367C1-EC30-4662-9E6E-7F1C28FD8A08}" type="datetimeFigureOut">
               <a:rPr lang="en-CA" smtClean="0"/>
-              <a:t>21/06/2013</a:t>
+              <a:t>26/08/2013</a:t>
             </a:fld>
             <a:endParaRPr lang="en-CA"/>
           </a:p>
@@ -628,7 +632,7 @@
           <a:p>
             <a:fld id="{7E8367C1-EC30-4662-9E6E-7F1C28FD8A08}" type="datetimeFigureOut">
               <a:rPr lang="en-CA" smtClean="0"/>
-              <a:t>21/06/2013</a:t>
+              <a:t>26/08/2013</a:t>
             </a:fld>
             <a:endParaRPr lang="en-CA"/>
           </a:p>
@@ -851,7 +855,7 @@
           <a:p>
             <a:fld id="{7E8367C1-EC30-4662-9E6E-7F1C28FD8A08}" type="datetimeFigureOut">
               <a:rPr lang="en-CA" smtClean="0"/>
-              <a:t>21/06/2013</a:t>
+              <a:t>26/08/2013</a:t>
             </a:fld>
             <a:endParaRPr lang="en-CA"/>
           </a:p>
@@ -1046,7 +1050,7 @@
           <a:p>
             <a:fld id="{7E8367C1-EC30-4662-9E6E-7F1C28FD8A08}" type="datetimeFigureOut">
               <a:rPr lang="en-CA" smtClean="0"/>
-              <a:t>21/06/2013</a:t>
+              <a:t>26/08/2013</a:t>
             </a:fld>
             <a:endParaRPr lang="en-CA"/>
           </a:p>
@@ -1326,7 +1330,7 @@
           <a:p>
             <a:fld id="{7E8367C1-EC30-4662-9E6E-7F1C28FD8A08}" type="datetimeFigureOut">
               <a:rPr lang="en-CA" smtClean="0"/>
-              <a:t>21/06/2013</a:t>
+              <a:t>26/08/2013</a:t>
             </a:fld>
             <a:endParaRPr lang="en-CA"/>
           </a:p>
@@ -1799,7 +1803,7 @@
           <a:p>
             <a:fld id="{7E8367C1-EC30-4662-9E6E-7F1C28FD8A08}" type="datetimeFigureOut">
               <a:rPr lang="en-CA" smtClean="0"/>
-              <a:t>21/06/2013</a:t>
+              <a:t>26/08/2013</a:t>
             </a:fld>
             <a:endParaRPr lang="en-CA"/>
           </a:p>
@@ -2254,7 +2258,7 @@
           <a:p>
             <a:fld id="{7E8367C1-EC30-4662-9E6E-7F1C28FD8A08}" type="datetimeFigureOut">
               <a:rPr lang="en-CA" smtClean="0"/>
-              <a:t>21/06/2013</a:t>
+              <a:t>26/08/2013</a:t>
             </a:fld>
             <a:endParaRPr lang="en-CA"/>
           </a:p>
@@ -2392,7 +2396,7 @@
           <a:p>
             <a:fld id="{7E8367C1-EC30-4662-9E6E-7F1C28FD8A08}" type="datetimeFigureOut">
               <a:rPr lang="en-CA" smtClean="0"/>
-              <a:t>21/06/2013</a:t>
+              <a:t>26/08/2013</a:t>
             </a:fld>
             <a:endParaRPr lang="en-CA"/>
           </a:p>
@@ -2553,7 +2557,7 @@
           <a:p>
             <a:fld id="{7E8367C1-EC30-4662-9E6E-7F1C28FD8A08}" type="datetimeFigureOut">
               <a:rPr lang="en-CA" smtClean="0"/>
-              <a:t>21/06/2013</a:t>
+              <a:t>26/08/2013</a:t>
             </a:fld>
             <a:endParaRPr lang="en-CA"/>
           </a:p>
@@ -2947,7 +2951,7 @@
           <a:p>
             <a:fld id="{7E8367C1-EC30-4662-9E6E-7F1C28FD8A08}" type="datetimeFigureOut">
               <a:rPr lang="en-CA" smtClean="0"/>
-              <a:t>21/06/2013</a:t>
+              <a:t>26/08/2013</a:t>
             </a:fld>
             <a:endParaRPr lang="en-CA"/>
           </a:p>
@@ -3347,7 +3351,7 @@
           <a:p>
             <a:fld id="{7E8367C1-EC30-4662-9E6E-7F1C28FD8A08}" type="datetimeFigureOut">
               <a:rPr lang="en-CA" smtClean="0"/>
-              <a:t>21/06/2013</a:t>
+              <a:t>26/08/2013</a:t>
             </a:fld>
             <a:endParaRPr lang="en-CA"/>
           </a:p>
@@ -3557,7 +3561,7 @@
           <a:p>
             <a:fld id="{7E8367C1-EC30-4662-9E6E-7F1C28FD8A08}" type="datetimeFigureOut">
               <a:rPr lang="en-CA" smtClean="0"/>
-              <a:t>21/06/2013</a:t>
+              <a:t>26/08/2013</a:t>
             </a:fld>
             <a:endParaRPr lang="en-CA"/>
           </a:p>
@@ -4023,6 +4027,380 @@
 </p:sld>
 </file>
 
+<file path=ppt/slides/slide10.xml><?xml version="1.0" encoding="utf-8"?>
+<p:sld xmlns:a="http://schemas.openxmlformats.org/drawingml/2006/main" xmlns:r="http://schemas.openxmlformats.org/officeDocument/2006/relationships" xmlns:p="http://schemas.openxmlformats.org/presentationml/2006/main">
+  <p:cSld>
+    <p:spTree>
+      <p:nvGrpSpPr>
+        <p:cNvPr id="1" name=""/>
+        <p:cNvGrpSpPr/>
+        <p:nvPr/>
+      </p:nvGrpSpPr>
+      <p:grpSpPr>
+        <a:xfrm>
+          <a:off x="0" y="0"/>
+          <a:ext cx="0" cy="0"/>
+          <a:chOff x="0" y="0"/>
+          <a:chExt cx="0" cy="0"/>
+        </a:xfrm>
+      </p:grpSpPr>
+      <p:sp>
+        <p:nvSpPr>
+          <p:cNvPr id="3" name="Content Placeholder 2"/>
+          <p:cNvSpPr>
+            <a:spLocks noGrp="1"/>
+          </p:cNvSpPr>
+          <p:nvPr>
+            <p:ph sz="quarter" idx="13"/>
+          </p:nvPr>
+        </p:nvSpPr>
+        <p:spPr/>
+        <p:txBody>
+          <a:bodyPr>
+            <a:normAutofit/>
+          </a:bodyPr>
+          <a:lstStyle/>
+          <a:p>
+            <a:pPr marL="285750" indent="-285750">
+              <a:buFont typeface="Arial" panose="020B0604020202020204" pitchFamily="34" charset="0"/>
+              <a:buChar char="•"/>
+            </a:pPr>
+            <a:r>
+              <a:rPr lang="en-US" sz="2400" dirty="0" smtClean="0"/>
+              <a:t>Finding enough raster time</a:t>
+            </a:r>
+          </a:p>
+          <a:p>
+            <a:pPr marL="285750" indent="-285750">
+              <a:buFont typeface="Arial" panose="020B0604020202020204" pitchFamily="34" charset="0"/>
+              <a:buChar char="•"/>
+            </a:pPr>
+            <a:r>
+              <a:rPr lang="en-US" sz="2400" dirty="0" smtClean="0"/>
+              <a:t>Handling the 8-sprite limit on C64  (can’t multiplex)</a:t>
+            </a:r>
+          </a:p>
+          <a:p>
+            <a:pPr marL="285750" indent="-285750">
+              <a:buFont typeface="Arial" panose="020B0604020202020204" pitchFamily="34" charset="0"/>
+              <a:buChar char="•"/>
+            </a:pPr>
+            <a:r>
+              <a:rPr lang="en-US" sz="2400" dirty="0" smtClean="0"/>
+              <a:t>Algorithmic generation of game “universe”</a:t>
+            </a:r>
+          </a:p>
+          <a:p>
+            <a:pPr marL="0" indent="0">
+              <a:buNone/>
+            </a:pPr>
+            <a:endParaRPr lang="en-US" sz="2400" dirty="0"/>
+          </a:p>
+        </p:txBody>
+      </p:sp>
+      <p:sp>
+        <p:nvSpPr>
+          <p:cNvPr id="2" name="Title 1"/>
+          <p:cNvSpPr>
+            <a:spLocks noGrp="1"/>
+          </p:cNvSpPr>
+          <p:nvPr>
+            <p:ph type="title"/>
+          </p:nvPr>
+        </p:nvSpPr>
+        <p:spPr/>
+        <p:txBody>
+          <a:bodyPr/>
+          <a:lstStyle/>
+          <a:p>
+            <a:r>
+              <a:rPr lang="en-US" dirty="0" smtClean="0"/>
+              <a:t>Technical Challenges</a:t>
+            </a:r>
+            <a:endParaRPr lang="en-US" dirty="0"/>
+          </a:p>
+        </p:txBody>
+      </p:sp>
+    </p:spTree>
+    <p:extLst>
+      <p:ext uri="{BB962C8B-B14F-4D97-AF65-F5344CB8AC3E}">
+        <p14:creationId xmlns:p14="http://schemas.microsoft.com/office/powerpoint/2010/main" val="1695731669"/>
+      </p:ext>
+    </p:extLst>
+  </p:cSld>
+  <p:clrMapOvr>
+    <a:masterClrMapping/>
+  </p:clrMapOvr>
+  <p:timing>
+    <p:tnLst>
+      <p:par>
+        <p:cTn id="1" dur="indefinite" restart="never" nodeType="tmRoot"/>
+      </p:par>
+    </p:tnLst>
+  </p:timing>
+</p:sld>
+</file>
+
+<file path=ppt/slides/slide11.xml><?xml version="1.0" encoding="utf-8"?>
+<p:sld xmlns:a="http://schemas.openxmlformats.org/drawingml/2006/main" xmlns:r="http://schemas.openxmlformats.org/officeDocument/2006/relationships" xmlns:p="http://schemas.openxmlformats.org/presentationml/2006/main">
+  <p:cSld>
+    <p:spTree>
+      <p:nvGrpSpPr>
+        <p:cNvPr id="1" name=""/>
+        <p:cNvGrpSpPr/>
+        <p:nvPr/>
+      </p:nvGrpSpPr>
+      <p:grpSpPr>
+        <a:xfrm>
+          <a:off x="0" y="0"/>
+          <a:ext cx="0" cy="0"/>
+          <a:chOff x="0" y="0"/>
+          <a:chExt cx="0" cy="0"/>
+        </a:xfrm>
+      </p:grpSpPr>
+      <p:sp>
+        <p:nvSpPr>
+          <p:cNvPr id="3" name="Content Placeholder 2"/>
+          <p:cNvSpPr>
+            <a:spLocks noGrp="1"/>
+          </p:cNvSpPr>
+          <p:nvPr>
+            <p:ph sz="quarter" idx="13"/>
+          </p:nvPr>
+        </p:nvSpPr>
+        <p:spPr/>
+        <p:txBody>
+          <a:bodyPr>
+            <a:normAutofit/>
+          </a:bodyPr>
+          <a:lstStyle/>
+          <a:p>
+            <a:r>
+              <a:rPr lang="en-US" u="sng" dirty="0" smtClean="0"/>
+              <a:t>Development:</a:t>
+            </a:r>
+            <a:endParaRPr lang="en-US" dirty="0" smtClean="0"/>
+          </a:p>
+          <a:p>
+            <a:r>
+              <a:rPr lang="en-US" dirty="0" smtClean="0"/>
+              <a:t>Leif </a:t>
+            </a:r>
+            <a:r>
+              <a:rPr lang="en-US" dirty="0" err="1" smtClean="0"/>
+              <a:t>Bloomquist</a:t>
+            </a:r>
+            <a:r>
+              <a:rPr lang="en-US" dirty="0" smtClean="0"/>
+              <a:t> (Concept</a:t>
+            </a:r>
+            <a:r>
+              <a:rPr lang="en-US" dirty="0" smtClean="0"/>
+              <a:t>, </a:t>
+            </a:r>
+            <a:r>
+              <a:rPr lang="en-US" dirty="0" smtClean="0"/>
+              <a:t>Networking, Server code)</a:t>
+            </a:r>
+          </a:p>
+          <a:p>
+            <a:r>
+              <a:rPr lang="en-US" dirty="0" smtClean="0"/>
+              <a:t>Saul Cross (Graphics)</a:t>
+            </a:r>
+          </a:p>
+          <a:p>
+            <a:r>
+              <a:rPr lang="en-US" dirty="0" smtClean="0"/>
+              <a:t>Bryce Wilson  (Client code)</a:t>
+            </a:r>
+          </a:p>
+          <a:p>
+            <a:r>
+              <a:rPr lang="en-US" dirty="0" smtClean="0"/>
+              <a:t>Robin </a:t>
+            </a:r>
+            <a:r>
+              <a:rPr lang="en-US" dirty="0" err="1" smtClean="0"/>
+              <a:t>Harbron</a:t>
+            </a:r>
+            <a:r>
+              <a:rPr lang="en-US" dirty="0" smtClean="0"/>
+              <a:t>  (A bit of everything)</a:t>
+            </a:r>
+          </a:p>
+          <a:p>
+            <a:endParaRPr lang="en-US" dirty="0"/>
+          </a:p>
+          <a:p>
+            <a:r>
+              <a:rPr lang="en-US" u="sng" dirty="0" smtClean="0"/>
+              <a:t>Support</a:t>
+            </a:r>
+            <a:r>
+              <a:rPr lang="en-US" dirty="0" smtClean="0"/>
+              <a:t>:</a:t>
+            </a:r>
+          </a:p>
+          <a:p>
+            <a:r>
+              <a:rPr lang="en-US" dirty="0" err="1" smtClean="0"/>
+              <a:t>Jonno</a:t>
+            </a:r>
+            <a:r>
+              <a:rPr lang="en-US" dirty="0" smtClean="0"/>
+              <a:t> </a:t>
+            </a:r>
+            <a:r>
+              <a:rPr lang="en-US" dirty="0" err="1" smtClean="0"/>
+              <a:t>Downes</a:t>
+            </a:r>
+            <a:r>
+              <a:rPr lang="en-US" dirty="0" smtClean="0"/>
+              <a:t> (IP65 networking code)</a:t>
+            </a:r>
+          </a:p>
+          <a:p>
+            <a:r>
+              <a:rPr lang="en-US" dirty="0"/>
+              <a:t>Dan </a:t>
+            </a:r>
+            <a:r>
+              <a:rPr lang="en-US" dirty="0" err="1" smtClean="0"/>
+              <a:t>Roganti</a:t>
+            </a:r>
+            <a:r>
+              <a:rPr lang="en-US" dirty="0" smtClean="0"/>
+              <a:t> (</a:t>
+            </a:r>
+            <a:r>
+              <a:rPr lang="en-US" dirty="0" err="1" smtClean="0"/>
+              <a:t>Playtesting</a:t>
+            </a:r>
+            <a:r>
+              <a:rPr lang="en-US" dirty="0" smtClean="0"/>
+              <a:t>)</a:t>
+            </a:r>
+          </a:p>
+          <a:p>
+            <a:endParaRPr lang="en-US" dirty="0" smtClean="0"/>
+          </a:p>
+          <a:p>
+            <a:r>
+              <a:rPr lang="en-US" dirty="0" smtClean="0"/>
+              <a:t>…and you?  </a:t>
+            </a:r>
+            <a:r>
+              <a:rPr lang="en-US" b="1" u="sng" dirty="0" smtClean="0"/>
+              <a:t>Join us!</a:t>
+            </a:r>
+            <a:endParaRPr lang="en-US" b="1" u="sng" dirty="0"/>
+          </a:p>
+        </p:txBody>
+      </p:sp>
+      <p:sp>
+        <p:nvSpPr>
+          <p:cNvPr id="2" name="Title 1"/>
+          <p:cNvSpPr>
+            <a:spLocks noGrp="1"/>
+          </p:cNvSpPr>
+          <p:nvPr>
+            <p:ph type="title"/>
+          </p:nvPr>
+        </p:nvSpPr>
+        <p:spPr/>
+        <p:txBody>
+          <a:bodyPr/>
+          <a:lstStyle/>
+          <a:p>
+            <a:r>
+              <a:rPr lang="en-US" dirty="0" smtClean="0"/>
+              <a:t>The Team</a:t>
+            </a:r>
+            <a:endParaRPr lang="en-US" dirty="0"/>
+          </a:p>
+        </p:txBody>
+      </p:sp>
+    </p:spTree>
+    <p:extLst>
+      <p:ext uri="{BB962C8B-B14F-4D97-AF65-F5344CB8AC3E}">
+        <p14:creationId xmlns:p14="http://schemas.microsoft.com/office/powerpoint/2010/main" val="1513897396"/>
+      </p:ext>
+    </p:extLst>
+  </p:cSld>
+  <p:clrMapOvr>
+    <a:masterClrMapping/>
+  </p:clrMapOvr>
+  <p:timing>
+    <p:tnLst>
+      <p:par>
+        <p:cTn id="1" dur="indefinite" restart="never" nodeType="tmRoot"/>
+      </p:par>
+    </p:tnLst>
+  </p:timing>
+</p:sld>
+</file>
+
+<file path=ppt/slides/slide12.xml><?xml version="1.0" encoding="utf-8"?>
+<p:sld xmlns:a="http://schemas.openxmlformats.org/drawingml/2006/main" xmlns:r="http://schemas.openxmlformats.org/officeDocument/2006/relationships" xmlns:p="http://schemas.openxmlformats.org/presentationml/2006/main">
+  <p:cSld>
+    <p:spTree>
+      <p:nvGrpSpPr>
+        <p:cNvPr id="1" name=""/>
+        <p:cNvGrpSpPr/>
+        <p:nvPr/>
+      </p:nvGrpSpPr>
+      <p:grpSpPr>
+        <a:xfrm>
+          <a:off x="0" y="0"/>
+          <a:ext cx="0" cy="0"/>
+          <a:chOff x="0" y="0"/>
+          <a:chExt cx="0" cy="0"/>
+        </a:xfrm>
+      </p:grpSpPr>
+      <p:sp>
+        <p:nvSpPr>
+          <p:cNvPr id="2" name="Title 1"/>
+          <p:cNvSpPr>
+            <a:spLocks noGrp="1"/>
+          </p:cNvSpPr>
+          <p:nvPr>
+            <p:ph type="title"/>
+          </p:nvPr>
+        </p:nvSpPr>
+        <p:spPr/>
+        <p:txBody>
+          <a:bodyPr/>
+          <a:lstStyle/>
+          <a:p>
+            <a:r>
+              <a:rPr lang="en-US" dirty="0" smtClean="0"/>
+              <a:t>Demo Time!</a:t>
+            </a:r>
+            <a:endParaRPr lang="en-US" dirty="0"/>
+          </a:p>
+        </p:txBody>
+      </p:sp>
+    </p:spTree>
+    <p:extLst>
+      <p:ext uri="{BB962C8B-B14F-4D97-AF65-F5344CB8AC3E}">
+        <p14:creationId xmlns:p14="http://schemas.microsoft.com/office/powerpoint/2010/main" val="725127539"/>
+      </p:ext>
+    </p:extLst>
+  </p:cSld>
+  <p:clrMapOvr>
+    <a:masterClrMapping/>
+  </p:clrMapOvr>
+  <p:timing>
+    <p:tnLst>
+      <p:par>
+        <p:cTn id="1" dur="indefinite" restart="never" nodeType="tmRoot"/>
+      </p:par>
+    </p:tnLst>
+  </p:timing>
+</p:sld>
+</file>
+
 <file path=ppt/slides/slide2.xml><?xml version="1.0" encoding="utf-8"?>
 <p:sld xmlns:a="http://schemas.openxmlformats.org/drawingml/2006/main" xmlns:r="http://schemas.openxmlformats.org/officeDocument/2006/relationships" xmlns:p="http://schemas.openxmlformats.org/presentationml/2006/main">
   <p:cSld>
@@ -4062,29 +4440,26 @@
           </a:bodyPr>
           <a:lstStyle/>
           <a:p>
-            <a:endParaRPr lang="en-US" dirty="0" smtClean="0"/>
-          </a:p>
-          <a:p>
             <a:pPr marL="285750" indent="-285750">
               <a:buFont typeface="Arial" pitchFamily="34" charset="0"/>
               <a:buChar char="•"/>
             </a:pPr>
             <a:r>
-              <a:rPr lang="en-US" dirty="0" smtClean="0"/>
+              <a:rPr lang="en-US" sz="2400" dirty="0" smtClean="0"/>
               <a:t>Numerous Ethernet &amp; TCP/IP solutions for the Commodore 64 since  2003!</a:t>
             </a:r>
           </a:p>
           <a:p>
             <a:pPr marL="803275" lvl="3" indent="-285750"/>
             <a:r>
-              <a:rPr lang="en-US" dirty="0" smtClean="0"/>
+              <a:rPr lang="en-US" sz="2000" dirty="0" smtClean="0"/>
               <a:t>The Final Ethernet, RR-Net, FB-Net, 64NIC+  all based on CS8900 chip</a:t>
             </a:r>
           </a:p>
           <a:p>
             <a:pPr marL="803275" lvl="3" indent="-285750"/>
             <a:r>
-              <a:rPr lang="en-US" dirty="0" smtClean="0"/>
+              <a:rPr lang="en-US" sz="2000" dirty="0" smtClean="0"/>
               <a:t>Plus other unique solutions: Comet, Flyer, ETH64, Wiz5100, RN-XV</a:t>
             </a:r>
           </a:p>
@@ -4093,7 +4468,7 @@
               <a:buFont typeface="Arial" pitchFamily="34" charset="0"/>
               <a:buChar char="•"/>
             </a:pPr>
-            <a:endParaRPr lang="en-US" dirty="0" smtClean="0"/>
+            <a:endParaRPr lang="en-US" sz="2400" dirty="0" smtClean="0"/>
           </a:p>
           <a:p>
             <a:pPr marL="285750" indent="-285750">
@@ -4101,29 +4476,21 @@
               <a:buChar char="•"/>
             </a:pPr>
             <a:r>
-              <a:rPr lang="en-US" dirty="0" smtClean="0"/>
+              <a:rPr lang="en-US" sz="2400" dirty="0" smtClean="0"/>
               <a:t>Plenty of </a:t>
             </a:r>
             <a:r>
-              <a:rPr lang="en-US" b="1" dirty="0" smtClean="0"/>
+              <a:rPr lang="en-US" sz="2400" b="1" u="sng" dirty="0" smtClean="0"/>
               <a:t>tools</a:t>
             </a:r>
             <a:r>
-              <a:rPr lang="en-US" dirty="0" smtClean="0"/>
-              <a:t> – Disk imaging, File transfer, Telnet clients, Cross-development, Operating Systems (</a:t>
-            </a:r>
-            <a:r>
-              <a:rPr lang="en-US" dirty="0" err="1" smtClean="0"/>
-              <a:t>Contiki</a:t>
-            </a:r>
-            <a:r>
-              <a:rPr lang="en-US" dirty="0" smtClean="0"/>
-              <a:t>), etc.</a:t>
+              <a:rPr lang="en-US" sz="2400" dirty="0" smtClean="0"/>
+              <a:t> – Disk imaging, File transfer, Telnet clients, Cross-development, Chat, Operating Systems, etc.</a:t>
             </a:r>
             <a:br>
-              <a:rPr lang="en-US" dirty="0" smtClean="0"/>
+              <a:rPr lang="en-US" sz="2400" dirty="0" smtClean="0"/>
             </a:br>
-            <a:endParaRPr lang="en-US" dirty="0" smtClean="0"/>
+            <a:endParaRPr lang="en-US" sz="2400" dirty="0" smtClean="0"/>
           </a:p>
           <a:p>
             <a:pPr marL="285750" indent="-285750">
@@ -4131,15 +4498,15 @@
               <a:buChar char="•"/>
             </a:pPr>
             <a:r>
-              <a:rPr lang="en-US" dirty="0" smtClean="0"/>
+              <a:rPr lang="en-US" sz="2400" dirty="0" smtClean="0"/>
               <a:t>How about some </a:t>
             </a:r>
             <a:r>
-              <a:rPr lang="en-US" b="1" dirty="0" smtClean="0"/>
+              <a:rPr lang="en-US" sz="2400" b="1" u="sng" dirty="0" smtClean="0"/>
               <a:t>games</a:t>
             </a:r>
             <a:r>
-              <a:rPr lang="en-US" dirty="0" smtClean="0"/>
+              <a:rPr lang="en-US" sz="2400" dirty="0" smtClean="0"/>
               <a:t>?</a:t>
             </a:r>
           </a:p>
@@ -4217,154 +4584,111 @@
         </p:nvSpPr>
         <p:spPr>
           <a:xfrm>
-            <a:off x="395536" y="1567333"/>
+            <a:off x="467544" y="1556792"/>
             <a:ext cx="8229600" cy="4525963"/>
           </a:xfrm>
         </p:spPr>
         <p:txBody>
           <a:bodyPr>
-            <a:normAutofit fontScale="77500" lnSpcReduction="20000"/>
+            <a:noAutofit/>
           </a:bodyPr>
           <a:lstStyle/>
           <a:p>
-            <a:endParaRPr lang="en-US" dirty="0" smtClean="0"/>
-          </a:p>
+            <a:r>
+              <a:rPr lang="en-US" sz="2000" dirty="0" smtClean="0"/>
+              <a:t>Artillery Duel Network (2006)</a:t>
+            </a:r>
+          </a:p>
+          <a:p>
+            <a:pPr lvl="2"/>
+            <a:r>
+              <a:rPr lang="en-US" sz="1800" dirty="0" smtClean="0"/>
+              <a:t>Turn-based</a:t>
+            </a:r>
+          </a:p>
+          <a:p>
+            <a:pPr lvl="2"/>
+            <a:r>
+              <a:rPr lang="en-US" sz="1800" dirty="0" smtClean="0"/>
+              <a:t>One-on-one</a:t>
+            </a:r>
+          </a:p>
+          <a:p>
+            <a:pPr lvl="2"/>
+            <a:r>
+              <a:rPr lang="en-US" sz="1800" dirty="0" smtClean="0"/>
+              <a:t>Minimal game world</a:t>
+            </a:r>
+          </a:p>
+          <a:p>
+            <a:endParaRPr lang="en-US" sz="2000" dirty="0" smtClean="0"/>
+          </a:p>
+          <a:p>
+            <a:endParaRPr lang="en-US" sz="2000" dirty="0" smtClean="0"/>
+          </a:p>
+          <a:p>
+            <a:r>
+              <a:rPr lang="en-US" sz="2000" dirty="0" err="1" smtClean="0"/>
+              <a:t>NetRacer</a:t>
+            </a:r>
+            <a:r>
+              <a:rPr lang="en-US" sz="2000" dirty="0" smtClean="0"/>
+              <a:t> (2008)</a:t>
+            </a:r>
+          </a:p>
+          <a:p>
+            <a:pPr lvl="2"/>
+            <a:r>
+              <a:rPr lang="en-US" sz="1800" dirty="0" err="1" smtClean="0"/>
+              <a:t>Realtime</a:t>
+            </a:r>
+            <a:endParaRPr lang="en-US" sz="1800" dirty="0"/>
+          </a:p>
+          <a:p>
+            <a:pPr lvl="2"/>
+            <a:r>
+              <a:rPr lang="en-US" sz="1800" dirty="0" smtClean="0"/>
+              <a:t>Multiplayer (8 player limit)</a:t>
+            </a:r>
+          </a:p>
+          <a:p>
+            <a:pPr lvl="2"/>
+            <a:r>
+              <a:rPr lang="en-US" sz="1800" dirty="0" smtClean="0"/>
+              <a:t>Introduced a server</a:t>
+            </a:r>
+          </a:p>
+          <a:p>
+            <a:pPr lvl="2"/>
+            <a:r>
+              <a:rPr lang="en-US" sz="1800" dirty="0" smtClean="0"/>
+              <a:t>Larger but static game  world</a:t>
+            </a:r>
+          </a:p>
+          <a:p>
+            <a:pPr lvl="2"/>
+            <a:endParaRPr lang="en-US" sz="1800" dirty="0" smtClean="0"/>
+          </a:p>
+        </p:txBody>
+      </p:sp>
+      <p:sp>
+        <p:nvSpPr>
+          <p:cNvPr id="2" name="Title 1"/>
+          <p:cNvSpPr>
+            <a:spLocks noGrp="1"/>
+          </p:cNvSpPr>
+          <p:nvPr>
+            <p:ph type="title"/>
+          </p:nvPr>
+        </p:nvSpPr>
+        <p:spPr/>
+        <p:txBody>
+          <a:bodyPr/>
+          <a:lstStyle/>
           <a:p>
             <a:r>
               <a:rPr lang="en-US" dirty="0" smtClean="0"/>
-              <a:t>Artillery Duel Network (2006)</a:t>
-            </a:r>
-          </a:p>
-          <a:p>
-            <a:pPr lvl="2"/>
-            <a:r>
-              <a:rPr lang="en-US" dirty="0" smtClean="0"/>
-              <a:t>Turn-based</a:t>
-            </a:r>
-          </a:p>
-          <a:p>
-            <a:pPr lvl="2"/>
-            <a:r>
-              <a:rPr lang="en-US" dirty="0" smtClean="0"/>
-              <a:t>One on one</a:t>
-            </a:r>
-          </a:p>
-          <a:p>
-            <a:pPr lvl="2"/>
-            <a:r>
-              <a:rPr lang="en-US" dirty="0" smtClean="0"/>
-              <a:t>Minimal game world</a:t>
-            </a:r>
-          </a:p>
-          <a:p>
-            <a:endParaRPr lang="en-US" dirty="0" smtClean="0"/>
-          </a:p>
-          <a:p>
-            <a:r>
-              <a:rPr lang="en-US" dirty="0" err="1" smtClean="0"/>
-              <a:t>NetRacer</a:t>
-            </a:r>
-            <a:r>
-              <a:rPr lang="en-US" dirty="0" smtClean="0"/>
-              <a:t> (2008)</a:t>
-            </a:r>
-          </a:p>
-          <a:p>
-            <a:pPr lvl="2"/>
-            <a:r>
-              <a:rPr lang="en-US" dirty="0" err="1" smtClean="0"/>
-              <a:t>Realtime</a:t>
-            </a:r>
-            <a:endParaRPr lang="en-US" dirty="0"/>
-          </a:p>
-          <a:p>
-            <a:pPr lvl="2"/>
-            <a:r>
-              <a:rPr lang="en-US" dirty="0" smtClean="0"/>
-              <a:t>Multiplayer</a:t>
-            </a:r>
-          </a:p>
-          <a:p>
-            <a:pPr lvl="2"/>
-            <a:r>
-              <a:rPr lang="en-US" dirty="0" smtClean="0"/>
-              <a:t>Introduced a server</a:t>
-            </a:r>
-          </a:p>
-          <a:p>
-            <a:pPr lvl="2"/>
-            <a:r>
-              <a:rPr lang="en-US" dirty="0" smtClean="0"/>
-              <a:t>Larger but static game  world</a:t>
-            </a:r>
-          </a:p>
-          <a:p>
-            <a:pPr lvl="2"/>
-            <a:endParaRPr lang="en-US" dirty="0" smtClean="0"/>
-          </a:p>
-          <a:p>
-            <a:r>
-              <a:rPr lang="en-US" dirty="0" smtClean="0"/>
-              <a:t>Ready to tackle something more ambitious! (2013)</a:t>
-            </a:r>
-          </a:p>
-          <a:p>
-            <a:pPr lvl="2"/>
-            <a:r>
-              <a:rPr lang="en-US" dirty="0" err="1" smtClean="0"/>
-              <a:t>Realtime</a:t>
-            </a:r>
-            <a:endParaRPr lang="en-US" dirty="0" smtClean="0"/>
-          </a:p>
-          <a:p>
-            <a:pPr lvl="2"/>
-            <a:r>
-              <a:rPr lang="en-US" dirty="0" smtClean="0"/>
-              <a:t>“Massively” multiplayer</a:t>
-            </a:r>
-          </a:p>
-          <a:p>
-            <a:pPr lvl="2"/>
-            <a:r>
-              <a:rPr lang="en-US" dirty="0" smtClean="0"/>
-              <a:t>Dynamic, massive game world</a:t>
-            </a:r>
-          </a:p>
-          <a:p>
-            <a:pPr lvl="2"/>
-            <a:r>
-              <a:rPr lang="en-US" dirty="0" smtClean="0"/>
-              <a:t>Server-controlled entities</a:t>
-            </a:r>
-          </a:p>
-          <a:p>
-            <a:pPr lvl="2"/>
-            <a:r>
-              <a:rPr lang="en-US" dirty="0" smtClean="0"/>
-              <a:t>More complex gameplay with multiple goals, encouraging teamwork</a:t>
-            </a:r>
-            <a:endParaRPr lang="en-US" dirty="0"/>
-          </a:p>
-        </p:txBody>
-      </p:sp>
-      <p:sp>
-        <p:nvSpPr>
-          <p:cNvPr id="2" name="Title 1"/>
-          <p:cNvSpPr>
-            <a:spLocks noGrp="1"/>
-          </p:cNvSpPr>
-          <p:nvPr>
-            <p:ph type="title"/>
-          </p:nvPr>
-        </p:nvSpPr>
-        <p:spPr/>
-        <p:txBody>
-          <a:bodyPr/>
-          <a:lstStyle/>
-          <a:p>
-            <a:r>
-              <a:rPr lang="en-US" dirty="0" smtClean="0"/>
-              <a:t>History</a:t>
+              <a:t>History continued</a:t>
             </a:r>
             <a:endParaRPr lang="en-US" dirty="0"/>
           </a:p>
@@ -4393,8 +4717,8 @@
         </p:blipFill>
         <p:spPr bwMode="auto">
           <a:xfrm>
-            <a:off x="5082956" y="1340768"/>
-            <a:ext cx="2064722" cy="1238833"/>
+            <a:off x="5292080" y="1324130"/>
+            <a:ext cx="3336121" cy="2001673"/>
           </a:xfrm>
           <a:prstGeom prst="rect">
             <a:avLst/>
@@ -4439,8 +4763,8 @@
         </p:blipFill>
         <p:spPr bwMode="auto">
           <a:xfrm>
-            <a:off x="5076504" y="3140968"/>
-            <a:ext cx="2071174" cy="1251738"/>
+            <a:off x="5292079" y="4144821"/>
+            <a:ext cx="3336122" cy="2016224"/>
           </a:xfrm>
           <a:prstGeom prst="rect">
             <a:avLst/>
@@ -4504,6 +4828,79 @@
       </p:grpSpPr>
       <p:sp>
         <p:nvSpPr>
+          <p:cNvPr id="3" name="Content Placeholder 2"/>
+          <p:cNvSpPr>
+            <a:spLocks noGrp="1"/>
+          </p:cNvSpPr>
+          <p:nvPr>
+            <p:ph sz="quarter" idx="13"/>
+          </p:nvPr>
+        </p:nvSpPr>
+        <p:spPr>
+          <a:xfrm>
+            <a:off x="395536" y="1567333"/>
+            <a:ext cx="8229600" cy="4525963"/>
+          </a:xfrm>
+        </p:spPr>
+        <p:txBody>
+          <a:bodyPr>
+            <a:normAutofit/>
+          </a:bodyPr>
+          <a:lstStyle/>
+          <a:p>
+            <a:r>
+              <a:rPr lang="en-US" sz="2800" dirty="0" smtClean="0"/>
+              <a:t>Ready to tackle something more ambitious! (2013)</a:t>
+            </a:r>
+          </a:p>
+          <a:p>
+            <a:pPr lvl="2"/>
+            <a:r>
+              <a:rPr lang="en-US" sz="2400" dirty="0" err="1" smtClean="0"/>
+              <a:t>Realtime</a:t>
+            </a:r>
+            <a:endParaRPr lang="en-US" sz="2400" dirty="0" smtClean="0"/>
+          </a:p>
+          <a:p>
+            <a:pPr lvl="2"/>
+            <a:r>
+              <a:rPr lang="en-US" sz="2400" dirty="0" smtClean="0"/>
+              <a:t>“Massively” multiplayer (unlimited)</a:t>
+            </a:r>
+          </a:p>
+          <a:p>
+            <a:pPr lvl="2"/>
+            <a:r>
+              <a:rPr lang="en-US" sz="2400" dirty="0" smtClean="0"/>
+              <a:t>Server-controlled entities</a:t>
+            </a:r>
+          </a:p>
+          <a:p>
+            <a:pPr lvl="2"/>
+            <a:r>
+              <a:rPr lang="en-US" sz="2400" dirty="0" smtClean="0"/>
+              <a:t>More complex gameplay with multiple goals, encouraging teamwork</a:t>
+            </a:r>
+          </a:p>
+          <a:p>
+            <a:pPr lvl="2"/>
+            <a:r>
+              <a:rPr lang="en-US" sz="2400" dirty="0" smtClean="0"/>
+              <a:t>Massive, dynamic </a:t>
+            </a:r>
+            <a:r>
+              <a:rPr lang="en-US" sz="2400" dirty="0"/>
+              <a:t>game world</a:t>
+            </a:r>
+          </a:p>
+          <a:p>
+            <a:pPr lvl="2"/>
+            <a:endParaRPr lang="en-US" sz="2400" dirty="0"/>
+          </a:p>
+        </p:txBody>
+      </p:sp>
+      <p:sp>
+        <p:nvSpPr>
           <p:cNvPr id="2" name="Title 1"/>
           <p:cNvSpPr>
             <a:spLocks noGrp="1"/>
@@ -4514,115 +4911,21 @@
         </p:nvSpPr>
         <p:spPr/>
         <p:txBody>
-          <a:bodyPr>
-            <a:normAutofit fontScale="90000"/>
-          </a:bodyPr>
-          <a:lstStyle/>
-          <a:p>
-            <a:r>
-              <a:rPr lang="en-CA" dirty="0" smtClean="0"/>
-              <a:t>How massive?  Target 10,000 screens</a:t>
-            </a:r>
-            <a:endParaRPr lang="en-CA" dirty="0"/>
-          </a:p>
-        </p:txBody>
-      </p:sp>
-      <p:pic>
-        <p:nvPicPr>
-          <p:cNvPr id="1026" name="Picture 2"/>
-          <p:cNvPicPr>
-            <a:picLocks noChangeAspect="1" noChangeArrowheads="1"/>
-          </p:cNvPicPr>
-          <p:nvPr/>
-        </p:nvPicPr>
-        <p:blipFill>
-          <a:blip r:embed="rId2">
-            <a:extLst>
-              <a:ext uri="{28A0092B-C50C-407E-A947-70E740481C1C}">
-                <a14:useLocalDpi xmlns:a14="http://schemas.microsoft.com/office/drawing/2010/main" val="0"/>
-              </a:ext>
-            </a:extLst>
-          </a:blip>
-          <a:srcRect/>
-          <a:stretch>
-            <a:fillRect/>
-          </a:stretch>
-        </p:blipFill>
-        <p:spPr bwMode="auto">
-          <a:xfrm>
-            <a:off x="827584" y="2132856"/>
-            <a:ext cx="6977608" cy="4196180"/>
-          </a:xfrm>
-          <a:prstGeom prst="rect">
-            <a:avLst/>
-          </a:prstGeom>
-          <a:noFill/>
-          <a:ln>
-            <a:noFill/>
-          </a:ln>
-          <a:extLst>
-            <a:ext uri="{909E8E84-426E-40DD-AFC4-6F175D3DCCD1}">
-              <a14:hiddenFill xmlns:a14="http://schemas.microsoft.com/office/drawing/2010/main">
-                <a:solidFill>
-                  <a:schemeClr val="accent1"/>
-                </a:solidFill>
-              </a14:hiddenFill>
-            </a:ext>
-            <a:ext uri="{91240B29-F687-4F45-9708-019B960494DF}">
-              <a14:hiddenLine xmlns:a14="http://schemas.microsoft.com/office/drawing/2010/main" w="9525">
-                <a:solidFill>
-                  <a:schemeClr val="tx1"/>
-                </a:solidFill>
-                <a:miter lim="800000"/>
-                <a:headEnd/>
-                <a:tailEnd/>
-              </a14:hiddenLine>
-            </a:ext>
-          </a:extLst>
-        </p:spPr>
-      </p:pic>
-      <p:sp>
-        <p:nvSpPr>
-          <p:cNvPr id="4" name="Left Brace 3"/>
-          <p:cNvSpPr/>
-          <p:nvPr/>
-        </p:nvSpPr>
-        <p:spPr>
-          <a:xfrm rot="5400000">
-            <a:off x="4193398" y="-1661522"/>
-            <a:ext cx="216025" cy="6947655"/>
-          </a:xfrm>
-          <a:prstGeom prst="leftBrace">
-            <a:avLst/>
-          </a:prstGeom>
-        </p:spPr>
-        <p:style>
-          <a:lnRef idx="1">
-            <a:schemeClr val="accent1"/>
-          </a:lnRef>
-          <a:fillRef idx="0">
-            <a:schemeClr val="accent1"/>
-          </a:fillRef>
-          <a:effectRef idx="0">
-            <a:schemeClr val="accent1"/>
-          </a:effectRef>
-          <a:fontRef idx="minor">
-            <a:schemeClr val="tx1"/>
-          </a:fontRef>
-        </p:style>
-        <p:txBody>
-          <a:bodyPr rtlCol="0" anchor="ctr"/>
-          <a:lstStyle/>
-          <a:p>
-            <a:pPr algn="ctr"/>
-            <a:endParaRPr lang="en-CA"/>
+          <a:bodyPr/>
+          <a:lstStyle/>
+          <a:p>
+            <a:r>
+              <a:rPr lang="en-US" dirty="0" smtClean="0"/>
+              <a:t>What Next?</a:t>
+            </a:r>
+            <a:endParaRPr lang="en-US" dirty="0"/>
           </a:p>
         </p:txBody>
       </p:sp>
     </p:spTree>
     <p:extLst>
       <p:ext uri="{BB962C8B-B14F-4D97-AF65-F5344CB8AC3E}">
-        <p14:creationId xmlns:p14="http://schemas.microsoft.com/office/powerpoint/2010/main" val="2129377920"/>
+        <p14:creationId xmlns:p14="http://schemas.microsoft.com/office/powerpoint/2010/main" val="4050241179"/>
       </p:ext>
     </p:extLst>
   </p:cSld>
@@ -4658,80 +4961,286 @@
       </p:grpSpPr>
       <p:sp>
         <p:nvSpPr>
-          <p:cNvPr id="3" name="Content Placeholder 2"/>
-          <p:cNvSpPr>
-            <a:spLocks noGrp="1"/>
-          </p:cNvSpPr>
-          <p:nvPr>
-            <p:ph sz="quarter" idx="13"/>
-          </p:nvPr>
-        </p:nvSpPr>
-        <p:spPr/>
+          <p:cNvPr id="2" name="Title 1"/>
+          <p:cNvSpPr>
+            <a:spLocks noGrp="1"/>
+          </p:cNvSpPr>
+          <p:nvPr>
+            <p:ph type="title"/>
+          </p:nvPr>
+        </p:nvSpPr>
+        <p:spPr>
+          <a:xfrm>
+            <a:off x="352426" y="-99392"/>
+            <a:ext cx="7680960" cy="1066800"/>
+          </a:xfrm>
+        </p:spPr>
         <p:txBody>
           <a:bodyPr>
-            <a:normAutofit/>
+            <a:normAutofit fontScale="90000"/>
           </a:bodyPr>
           <a:lstStyle/>
           <a:p>
             <a:r>
+              <a:rPr lang="en-CA" dirty="0" smtClean="0"/>
+              <a:t>How massive?   Target:  10,000 screens</a:t>
+            </a:r>
+            <a:endParaRPr lang="en-CA" dirty="0"/>
+          </a:p>
+        </p:txBody>
+      </p:sp>
+      <p:pic>
+        <p:nvPicPr>
+          <p:cNvPr id="1026" name="Picture 2"/>
+          <p:cNvPicPr>
+            <a:picLocks noChangeAspect="1" noChangeArrowheads="1"/>
+          </p:cNvPicPr>
+          <p:nvPr/>
+        </p:nvPicPr>
+        <p:blipFill>
+          <a:blip r:embed="rId2">
+            <a:extLst>
+              <a:ext uri="{28A0092B-C50C-407E-A947-70E740481C1C}">
+                <a14:useLocalDpi xmlns:a14="http://schemas.microsoft.com/office/drawing/2010/main" val="0"/>
+              </a:ext>
+            </a:extLst>
+          </a:blip>
+          <a:srcRect/>
+          <a:stretch>
+            <a:fillRect/>
+          </a:stretch>
+        </p:blipFill>
+        <p:spPr bwMode="auto">
+          <a:xfrm>
+            <a:off x="1043608" y="1897116"/>
+            <a:ext cx="6977608" cy="4196180"/>
+          </a:xfrm>
+          <a:prstGeom prst="rect">
+            <a:avLst/>
+          </a:prstGeom>
+          <a:noFill/>
+          <a:ln>
+            <a:noFill/>
+          </a:ln>
+          <a:extLst>
+            <a:ext uri="{909E8E84-426E-40DD-AFC4-6F175D3DCCD1}">
+              <a14:hiddenFill xmlns:a14="http://schemas.microsoft.com/office/drawing/2010/main">
+                <a:solidFill>
+                  <a:schemeClr val="accent1"/>
+                </a:solidFill>
+              </a14:hiddenFill>
+            </a:ext>
+            <a:ext uri="{91240B29-F687-4F45-9708-019B960494DF}">
+              <a14:hiddenLine xmlns:a14="http://schemas.microsoft.com/office/drawing/2010/main" w="9525">
+                <a:solidFill>
+                  <a:schemeClr val="tx1"/>
+                </a:solidFill>
+                <a:miter lim="800000"/>
+                <a:headEnd/>
+                <a:tailEnd/>
+              </a14:hiddenLine>
+            </a:ext>
+          </a:extLst>
+        </p:spPr>
+      </p:pic>
+      <p:sp>
+        <p:nvSpPr>
+          <p:cNvPr id="4" name="Left Brace 3"/>
+          <p:cNvSpPr/>
+          <p:nvPr/>
+        </p:nvSpPr>
+        <p:spPr>
+          <a:xfrm rot="5400000">
+            <a:off x="4409422" y="-1809023"/>
+            <a:ext cx="216025" cy="6947655"/>
+          </a:xfrm>
+          <a:prstGeom prst="leftBrace">
+            <a:avLst/>
+          </a:prstGeom>
+          <a:ln>
+            <a:solidFill>
+              <a:schemeClr val="tx1"/>
+            </a:solidFill>
+          </a:ln>
+        </p:spPr>
+        <p:style>
+          <a:lnRef idx="1">
+            <a:schemeClr val="accent1"/>
+          </a:lnRef>
+          <a:fillRef idx="0">
+            <a:schemeClr val="accent1"/>
+          </a:fillRef>
+          <a:effectRef idx="0">
+            <a:schemeClr val="accent1"/>
+          </a:effectRef>
+          <a:fontRef idx="minor">
+            <a:schemeClr val="tx1"/>
+          </a:fontRef>
+        </p:style>
+        <p:txBody>
+          <a:bodyPr rtlCol="0" anchor="ctr"/>
+          <a:lstStyle/>
+          <a:p>
+            <a:pPr algn="ctr"/>
+            <a:endParaRPr lang="en-CA"/>
+          </a:p>
+        </p:txBody>
+      </p:sp>
+      <p:sp>
+        <p:nvSpPr>
+          <p:cNvPr id="3" name="Rectangle 2"/>
+          <p:cNvSpPr/>
+          <p:nvPr/>
+        </p:nvSpPr>
+        <p:spPr>
+          <a:xfrm>
+            <a:off x="3563888" y="1196752"/>
+            <a:ext cx="1838965" cy="369332"/>
+          </a:xfrm>
+          <a:prstGeom prst="rect">
+            <a:avLst/>
+          </a:prstGeom>
+        </p:spPr>
+        <p:txBody>
+          <a:bodyPr wrap="none">
+            <a:spAutoFit/>
+          </a:bodyPr>
+          <a:lstStyle/>
+          <a:p>
+            <a:r>
               <a:rPr lang="en-US" dirty="0" smtClean="0"/>
-              <a:t>Vortex (C64)</a:t>
-            </a:r>
-          </a:p>
+              <a:t>100 screens wide </a:t>
+            </a:r>
+            <a:endParaRPr lang="en-US" dirty="0"/>
+          </a:p>
+        </p:txBody>
+      </p:sp>
+      <p:sp>
+        <p:nvSpPr>
+          <p:cNvPr id="6" name="Rectangle 5"/>
+          <p:cNvSpPr/>
+          <p:nvPr/>
+        </p:nvSpPr>
+        <p:spPr>
+          <a:xfrm rot="5400000">
+            <a:off x="7685192" y="3762900"/>
+            <a:ext cx="1757212" cy="369332"/>
+          </a:xfrm>
+          <a:prstGeom prst="rect">
+            <a:avLst/>
+          </a:prstGeom>
+        </p:spPr>
+        <p:txBody>
+          <a:bodyPr wrap="none">
+            <a:spAutoFit/>
+          </a:bodyPr>
+          <a:lstStyle/>
           <a:p>
             <a:r>
               <a:rPr lang="en-US" dirty="0" smtClean="0"/>
-              <a:t>Zone Ranger (C64)</a:t>
-            </a:r>
-          </a:p>
-          <a:p>
+              <a:t>100 screens high</a:t>
+            </a:r>
+            <a:endParaRPr lang="en-US" dirty="0"/>
+          </a:p>
+        </p:txBody>
+      </p:sp>
+      <p:sp>
+        <p:nvSpPr>
+          <p:cNvPr id="7" name="Left Brace 6"/>
+          <p:cNvSpPr/>
+          <p:nvPr/>
+        </p:nvSpPr>
+        <p:spPr>
+          <a:xfrm rot="10800000">
+            <a:off x="8064387" y="1834143"/>
+            <a:ext cx="324037" cy="4259153"/>
+          </a:xfrm>
+          <a:prstGeom prst="leftBrace">
+            <a:avLst/>
+          </a:prstGeom>
+          <a:ln>
+            <a:solidFill>
+              <a:schemeClr val="tx1"/>
+            </a:solidFill>
+          </a:ln>
+        </p:spPr>
+        <p:style>
+          <a:lnRef idx="1">
+            <a:schemeClr val="accent1"/>
+          </a:lnRef>
+          <a:fillRef idx="0">
+            <a:schemeClr val="accent1"/>
+          </a:fillRef>
+          <a:effectRef idx="0">
+            <a:schemeClr val="accent1"/>
+          </a:effectRef>
+          <a:fontRef idx="minor">
+            <a:schemeClr val="tx1"/>
+          </a:fontRef>
+        </p:style>
+        <p:txBody>
+          <a:bodyPr rtlCol="0" anchor="ctr"/>
+          <a:lstStyle/>
+          <a:p>
+            <a:pPr algn="ctr"/>
+            <a:endParaRPr lang="en-CA"/>
+          </a:p>
+        </p:txBody>
+      </p:sp>
+      <p:sp>
+        <p:nvSpPr>
+          <p:cNvPr id="8" name="Rectangle 7"/>
+          <p:cNvSpPr/>
+          <p:nvPr/>
+        </p:nvSpPr>
+        <p:spPr>
+          <a:xfrm>
+            <a:off x="899592" y="6117930"/>
+            <a:ext cx="5788508" cy="646331"/>
+          </a:xfrm>
+          <a:prstGeom prst="rect">
+            <a:avLst/>
+          </a:prstGeom>
+        </p:spPr>
+        <p:txBody>
+          <a:bodyPr wrap="none">
+            <a:spAutoFit/>
+          </a:bodyPr>
+          <a:lstStyle/>
+          <a:p>
+            <a:pPr marL="285750" indent="-285750">
+              <a:buFont typeface="Arial" panose="020B0604020202020204" pitchFamily="34" charset="0"/>
+              <a:buChar char="•"/>
+            </a:pPr>
             <a:r>
               <a:rPr lang="en-US" dirty="0" smtClean="0"/>
-              <a:t>Fort Apocalypse (C64)</a:t>
-            </a:r>
-          </a:p>
-          <a:p>
+              <a:t>Each screen 40 x 25 character cells</a:t>
+            </a:r>
+          </a:p>
+          <a:p>
+            <a:pPr marL="285750" indent="-285750">
+              <a:buFont typeface="Arial" panose="020B0604020202020204" pitchFamily="34" charset="0"/>
+              <a:buChar char="•"/>
+            </a:pPr>
             <a:r>
               <a:rPr lang="en-US" dirty="0" smtClean="0"/>
-              <a:t>Subspace (PC)</a:t>
-            </a:r>
-          </a:p>
-          <a:p>
-            <a:r>
-              <a:rPr lang="en-US" dirty="0" err="1" smtClean="0"/>
-              <a:t>Minecraft</a:t>
+              <a:t>Total of </a:t>
+            </a:r>
+            <a:r>
+              <a:rPr lang="en-US" dirty="0"/>
+              <a:t>10,000,000 </a:t>
             </a:r>
             <a:r>
               <a:rPr lang="en-US" dirty="0" smtClean="0"/>
-              <a:t> (PC)</a:t>
-            </a:r>
-          </a:p>
-          <a:p>
-            <a:pPr marL="0" indent="0">
-              <a:buNone/>
-            </a:pPr>
-            <a:endParaRPr lang="en-US" dirty="0"/>
-          </a:p>
-        </p:txBody>
-      </p:sp>
-      <p:sp>
-        <p:nvSpPr>
-          <p:cNvPr id="2" name="Title 1"/>
-          <p:cNvSpPr>
-            <a:spLocks noGrp="1"/>
-          </p:cNvSpPr>
-          <p:nvPr>
-            <p:ph type="title"/>
-          </p:nvPr>
-        </p:nvSpPr>
-        <p:spPr/>
-        <p:txBody>
-          <a:bodyPr/>
-          <a:lstStyle/>
-          <a:p>
+              <a:t>character cells or </a:t>
+            </a:r>
+            <a:r>
+              <a:rPr lang="en-US" dirty="0"/>
+              <a:t>640,000,000 </a:t>
+            </a:r>
             <a:r>
               <a:rPr lang="en-US" dirty="0" smtClean="0"/>
-              <a:t>Inspiration</a:t>
+              <a:t>pixels</a:t>
             </a:r>
             <a:endParaRPr lang="en-US" dirty="0"/>
           </a:p>
@@ -4740,7 +5249,7 @@
     </p:spTree>
     <p:extLst>
       <p:ext uri="{BB962C8B-B14F-4D97-AF65-F5344CB8AC3E}">
-        <p14:creationId xmlns:p14="http://schemas.microsoft.com/office/powerpoint/2010/main" val="257335462"/>
+        <p14:creationId xmlns:p14="http://schemas.microsoft.com/office/powerpoint/2010/main" val="2129377920"/>
       </p:ext>
     </p:extLst>
   </p:cSld>
@@ -4791,21 +5300,57 @@
           </a:bodyPr>
           <a:lstStyle/>
           <a:p>
+            <a:pPr marL="285750" indent="-285750">
+              <a:buFont typeface="Arial" panose="020B0604020202020204" pitchFamily="34" charset="0"/>
+              <a:buChar char="•"/>
+            </a:pPr>
             <a:r>
               <a:rPr lang="en-US" dirty="0" smtClean="0"/>
-              <a:t>Finding enough raster time</a:t>
-            </a:r>
-          </a:p>
-          <a:p>
+              <a:t>Vortex (C64)</a:t>
+            </a:r>
+          </a:p>
+          <a:p>
+            <a:pPr marL="285750" indent="-285750">
+              <a:buFont typeface="Arial" panose="020B0604020202020204" pitchFamily="34" charset="0"/>
+              <a:buChar char="•"/>
+            </a:pPr>
             <a:r>
               <a:rPr lang="en-US" dirty="0" smtClean="0"/>
-              <a:t>Handling the 8-sprite limit on C64  (can’t multiplex)</a:t>
-            </a:r>
-          </a:p>
-          <a:p>
+              <a:t>Zone Ranger (C64)</a:t>
+            </a:r>
+          </a:p>
+          <a:p>
+            <a:pPr marL="285750" indent="-285750">
+              <a:buFont typeface="Arial" panose="020B0604020202020204" pitchFamily="34" charset="0"/>
+              <a:buChar char="•"/>
+            </a:pPr>
             <a:r>
               <a:rPr lang="en-US" dirty="0" smtClean="0"/>
-              <a:t>Algorithmic generation of game “universe”</a:t>
+              <a:t>Fort Apocalypse (C64)</a:t>
+            </a:r>
+          </a:p>
+          <a:p>
+            <a:pPr marL="285750" indent="-285750">
+              <a:buFont typeface="Arial" panose="020B0604020202020204" pitchFamily="34" charset="0"/>
+              <a:buChar char="•"/>
+            </a:pPr>
+            <a:r>
+              <a:rPr lang="en-US" dirty="0" smtClean="0"/>
+              <a:t>Subspace (PC)</a:t>
+            </a:r>
+          </a:p>
+          <a:p>
+            <a:pPr marL="285750" indent="-285750">
+              <a:buFont typeface="Arial" panose="020B0604020202020204" pitchFamily="34" charset="0"/>
+              <a:buChar char="•"/>
+            </a:pPr>
+            <a:r>
+              <a:rPr lang="en-US" dirty="0" err="1" smtClean="0"/>
+              <a:t>Minecraft</a:t>
+            </a:r>
+            <a:r>
+              <a:rPr lang="en-US" dirty="0" smtClean="0"/>
+              <a:t> (PC)</a:t>
             </a:r>
           </a:p>
           <a:p>
@@ -4833,16 +5378,221 @@
           <a:p>
             <a:r>
               <a:rPr lang="en-US" dirty="0" smtClean="0"/>
-              <a:t>Technical Challenges</a:t>
+              <a:t>Inspiration</a:t>
             </a:r>
             <a:endParaRPr lang="en-US" dirty="0"/>
           </a:p>
         </p:txBody>
       </p:sp>
+      <p:pic>
+        <p:nvPicPr>
+          <p:cNvPr id="1026" name="Picture 2" descr="Vortex - C64 Screen"/>
+          <p:cNvPicPr>
+            <a:picLocks noChangeAspect="1" noChangeArrowheads="1"/>
+          </p:cNvPicPr>
+          <p:nvPr/>
+        </p:nvPicPr>
+        <p:blipFill>
+          <a:blip r:embed="rId2">
+            <a:extLst>
+              <a:ext uri="{28A0092B-C50C-407E-A947-70E740481C1C}">
+                <a14:useLocalDpi xmlns:a14="http://schemas.microsoft.com/office/drawing/2010/main" val="0"/>
+              </a:ext>
+            </a:extLst>
+          </a:blip>
+          <a:srcRect/>
+          <a:stretch>
+            <a:fillRect/>
+          </a:stretch>
+        </p:blipFill>
+        <p:spPr bwMode="auto">
+          <a:xfrm>
+            <a:off x="4319972" y="554516"/>
+            <a:ext cx="2691545" cy="1794363"/>
+          </a:xfrm>
+          <a:prstGeom prst="rect">
+            <a:avLst/>
+          </a:prstGeom>
+          <a:noFill/>
+          <a:extLst>
+            <a:ext uri="{909E8E84-426E-40DD-AFC4-6F175D3DCCD1}">
+              <a14:hiddenFill xmlns:a14="http://schemas.microsoft.com/office/drawing/2010/main">
+                <a:solidFill>
+                  <a:srgbClr val="FFFFFF"/>
+                </a:solidFill>
+              </a14:hiddenFill>
+            </a:ext>
+          </a:extLst>
+        </p:spPr>
+      </p:pic>
+      <p:pic>
+        <p:nvPicPr>
+          <p:cNvPr id="1028" name="Picture 4" descr="https://encrypted-tbn3.gstatic.com/images?q=tbn:ANd9GcTZNkPqGnOLzpjBcX17Bt_nueAA6BhkxGwqpFZRCOJwZY6Gl-0X"/>
+          <p:cNvPicPr>
+            <a:picLocks noChangeAspect="1" noChangeArrowheads="1"/>
+          </p:cNvPicPr>
+          <p:nvPr/>
+        </p:nvPicPr>
+        <p:blipFill>
+          <a:blip r:embed="rId3">
+            <a:extLst>
+              <a:ext uri="{28A0092B-C50C-407E-A947-70E740481C1C}">
+                <a14:useLocalDpi xmlns:a14="http://schemas.microsoft.com/office/drawing/2010/main" val="0"/>
+              </a:ext>
+            </a:extLst>
+          </a:blip>
+          <a:srcRect/>
+          <a:stretch>
+            <a:fillRect/>
+          </a:stretch>
+        </p:blipFill>
+        <p:spPr bwMode="auto">
+          <a:xfrm>
+            <a:off x="6516216" y="2636912"/>
+            <a:ext cx="2438400" cy="1524001"/>
+          </a:xfrm>
+          <a:prstGeom prst="rect">
+            <a:avLst/>
+          </a:prstGeom>
+          <a:noFill/>
+          <a:extLst>
+            <a:ext uri="{909E8E84-426E-40DD-AFC4-6F175D3DCCD1}">
+              <a14:hiddenFill xmlns:a14="http://schemas.microsoft.com/office/drawing/2010/main">
+                <a:solidFill>
+                  <a:srgbClr val="FFFFFF"/>
+                </a:solidFill>
+              </a14:hiddenFill>
+            </a:ext>
+          </a:extLst>
+        </p:spPr>
+      </p:pic>
+      <p:pic>
+        <p:nvPicPr>
+          <p:cNvPr id="1030" name="Picture 6" descr="http://i1.ytimg.com/vi/AWiH7yReD1I/hqdefault.jpg?feature=og"/>
+          <p:cNvPicPr>
+            <a:picLocks noChangeAspect="1" noChangeArrowheads="1"/>
+          </p:cNvPicPr>
+          <p:nvPr/>
+        </p:nvPicPr>
+        <p:blipFill>
+          <a:blip r:embed="rId4">
+            <a:extLst>
+              <a:ext uri="{28A0092B-C50C-407E-A947-70E740481C1C}">
+                <a14:useLocalDpi xmlns:a14="http://schemas.microsoft.com/office/drawing/2010/main" val="0"/>
+              </a:ext>
+            </a:extLst>
+          </a:blip>
+          <a:srcRect/>
+          <a:stretch>
+            <a:fillRect/>
+          </a:stretch>
+        </p:blipFill>
+        <p:spPr bwMode="auto">
+          <a:xfrm>
+            <a:off x="3239852" y="2636912"/>
+            <a:ext cx="2520280" cy="1890211"/>
+          </a:xfrm>
+          <a:prstGeom prst="rect">
+            <a:avLst/>
+          </a:prstGeom>
+          <a:noFill/>
+          <a:extLst>
+            <a:ext uri="{909E8E84-426E-40DD-AFC4-6F175D3DCCD1}">
+              <a14:hiddenFill xmlns:a14="http://schemas.microsoft.com/office/drawing/2010/main">
+                <a:solidFill>
+                  <a:srgbClr val="FFFFFF"/>
+                </a:solidFill>
+              </a14:hiddenFill>
+            </a:ext>
+          </a:extLst>
+        </p:spPr>
+      </p:pic>
+      <p:pic>
+        <p:nvPicPr>
+          <p:cNvPr id="1032" name="Picture 8" descr="http://4.bp.blogspot.com/-xpMlOZjVH1Y/TcuNfWib5dI/AAAAAAAAABE/y-hlS_91Ung/s640/Subspace+Continuum.gif"/>
+          <p:cNvPicPr>
+            <a:picLocks noChangeAspect="1" noChangeArrowheads="1"/>
+          </p:cNvPicPr>
+          <p:nvPr/>
+        </p:nvPicPr>
+        <p:blipFill>
+          <a:blip r:embed="rId5" cstate="print">
+            <a:extLst>
+              <a:ext uri="{28A0092B-C50C-407E-A947-70E740481C1C}">
+                <a14:useLocalDpi xmlns:a14="http://schemas.microsoft.com/office/drawing/2010/main" val="0"/>
+              </a:ext>
+            </a:extLst>
+          </a:blip>
+          <a:srcRect/>
+          <a:stretch>
+            <a:fillRect/>
+          </a:stretch>
+        </p:blipFill>
+        <p:spPr bwMode="auto">
+          <a:xfrm>
+            <a:off x="2159732" y="4800545"/>
+            <a:ext cx="2160240" cy="1582342"/>
+          </a:xfrm>
+          <a:prstGeom prst="rect">
+            <a:avLst/>
+          </a:prstGeom>
+          <a:noFill/>
+          <a:extLst>
+            <a:ext uri="{909E8E84-426E-40DD-AFC4-6F175D3DCCD1}">
+              <a14:hiddenFill xmlns:a14="http://schemas.microsoft.com/office/drawing/2010/main">
+                <a:solidFill>
+                  <a:srgbClr val="FFFFFF"/>
+                </a:solidFill>
+              </a14:hiddenFill>
+            </a:ext>
+          </a:extLst>
+        </p:spPr>
+      </p:pic>
+      <p:pic>
+        <p:nvPicPr>
+          <p:cNvPr id="1034" name="Picture 10" descr="http://media.edge-online.com/wp-content/uploads/edgeonline/2012/10/Minecraft-360.jpg"/>
+          <p:cNvPicPr>
+            <a:picLocks noChangeAspect="1" noChangeArrowheads="1"/>
+          </p:cNvPicPr>
+          <p:nvPr/>
+        </p:nvPicPr>
+        <p:blipFill>
+          <a:blip r:embed="rId6" cstate="print">
+            <a:extLst>
+              <a:ext uri="{28A0092B-C50C-407E-A947-70E740481C1C}">
+                <a14:useLocalDpi xmlns:a14="http://schemas.microsoft.com/office/drawing/2010/main" val="0"/>
+              </a:ext>
+            </a:extLst>
+          </a:blip>
+          <a:srcRect/>
+          <a:stretch>
+            <a:fillRect/>
+          </a:stretch>
+        </p:blipFill>
+        <p:spPr bwMode="auto">
+          <a:xfrm>
+            <a:off x="6018413" y="4941168"/>
+            <a:ext cx="2569909" cy="1441719"/>
+          </a:xfrm>
+          <a:prstGeom prst="rect">
+            <a:avLst/>
+          </a:prstGeom>
+          <a:noFill/>
+          <a:extLst>
+            <a:ext uri="{909E8E84-426E-40DD-AFC4-6F175D3DCCD1}">
+              <a14:hiddenFill xmlns:a14="http://schemas.microsoft.com/office/drawing/2010/main">
+                <a:solidFill>
+                  <a:srgbClr val="FFFFFF"/>
+                </a:solidFill>
+              </a14:hiddenFill>
+            </a:ext>
+          </a:extLst>
+        </p:spPr>
+      </p:pic>
     </p:spTree>
     <p:extLst>
       <p:ext uri="{BB962C8B-B14F-4D97-AF65-F5344CB8AC3E}">
-        <p14:creationId xmlns:p14="http://schemas.microsoft.com/office/powerpoint/2010/main" val="1695731669"/>
+        <p14:creationId xmlns:p14="http://schemas.microsoft.com/office/powerpoint/2010/main" val="257335462"/>
       </p:ext>
     </p:extLst>
   </p:cSld>
@@ -4898,56 +5648,172 @@
           </a:bodyPr>
           <a:lstStyle/>
           <a:p>
+            <a:pPr marL="285750" indent="-285750">
+              <a:buFont typeface="Arial" panose="020B0604020202020204" pitchFamily="34" charset="0"/>
+              <a:buChar char="•"/>
+            </a:pPr>
+            <a:r>
+              <a:rPr lang="en-US" sz="2400" dirty="0" smtClean="0"/>
+              <a:t>“Sequel” to the original game Vortex (Ahoy! Magazine, </a:t>
+            </a:r>
+            <a:r>
+              <a:rPr lang="en-US" sz="2400" dirty="0" smtClean="0">
+                <a:solidFill>
+                  <a:srgbClr val="FFFF00"/>
+                </a:solidFill>
+              </a:rPr>
+              <a:t>date</a:t>
+            </a:r>
+            <a:r>
+              <a:rPr lang="en-US" sz="2400" dirty="0" smtClean="0"/>
+              <a:t>?)</a:t>
+            </a:r>
+          </a:p>
+          <a:p>
+            <a:pPr marL="285750" indent="-285750">
+              <a:buFont typeface="Arial" panose="020B0604020202020204" pitchFamily="34" charset="0"/>
+              <a:buChar char="•"/>
+            </a:pPr>
+            <a:r>
+              <a:rPr lang="en-US" sz="2400" dirty="0" smtClean="0"/>
+              <a:t>Fast-paced overhead 2D space shoot-</a:t>
+            </a:r>
+            <a:r>
+              <a:rPr lang="en-US" sz="2400" dirty="0" err="1" smtClean="0"/>
+              <a:t>em</a:t>
+            </a:r>
+            <a:r>
+              <a:rPr lang="en-US" sz="2400" dirty="0" smtClean="0"/>
+              <a:t>’ </a:t>
+            </a:r>
+            <a:r>
+              <a:rPr lang="en-US" sz="2400" dirty="0" smtClean="0"/>
+              <a:t>up</a:t>
+            </a:r>
+            <a:endParaRPr lang="en-US" sz="2400" dirty="0" smtClean="0"/>
+          </a:p>
+          <a:p>
+            <a:pPr marL="285750" indent="-285750">
+              <a:buFont typeface="Arial" panose="020B0604020202020204" pitchFamily="34" charset="0"/>
+              <a:buChar char="•"/>
+            </a:pPr>
+            <a:r>
+              <a:rPr lang="en-US" sz="2400" dirty="0" smtClean="0"/>
+              <a:t>Dogfight with alien ships, seek </a:t>
+            </a:r>
+            <a:r>
+              <a:rPr lang="en-US" sz="2400" dirty="0" err="1" smtClean="0"/>
+              <a:t>powerups</a:t>
+            </a:r>
+            <a:r>
+              <a:rPr lang="en-US" sz="2400" dirty="0" smtClean="0"/>
+              <a:t>, save the </a:t>
+            </a:r>
+            <a:r>
+              <a:rPr lang="en-US" sz="2400" dirty="0" smtClean="0"/>
+              <a:t>universe</a:t>
+            </a:r>
+            <a:endParaRPr lang="en-US" sz="2400" dirty="0"/>
+          </a:p>
+          <a:p>
+            <a:pPr marL="285750" indent="-285750">
+              <a:buFont typeface="Arial" panose="020B0604020202020204" pitchFamily="34" charset="0"/>
+              <a:buChar char="•"/>
+            </a:pPr>
+            <a:r>
+              <a:rPr lang="en-US" sz="2400" dirty="0" smtClean="0"/>
+              <a:t>Teamwork encouraged!</a:t>
+            </a:r>
+            <a:endParaRPr lang="en-US" sz="2400" dirty="0"/>
+          </a:p>
+          <a:p>
+            <a:pPr marL="285750" indent="-285750">
+              <a:buFont typeface="Arial" panose="020B0604020202020204" pitchFamily="34" charset="0"/>
+              <a:buChar char="•"/>
+            </a:pPr>
+            <a:r>
+              <a:rPr lang="en-US" sz="2400" dirty="0" smtClean="0"/>
+              <a:t>Many gameplay details to be worked </a:t>
+            </a:r>
+            <a:r>
+              <a:rPr lang="en-US" sz="2400" dirty="0" smtClean="0"/>
+              <a:t>out</a:t>
+            </a:r>
+            <a:endParaRPr lang="en-US" sz="2400" dirty="0" smtClean="0"/>
+          </a:p>
+          <a:p>
+            <a:pPr marL="285750" indent="-285750">
+              <a:buFont typeface="Arial" panose="020B0604020202020204" pitchFamily="34" charset="0"/>
+              <a:buChar char="•"/>
+            </a:pPr>
+            <a:endParaRPr lang="en-US" sz="2400" dirty="0"/>
+          </a:p>
+          <a:p>
+            <a:endParaRPr lang="en-US" sz="2400" dirty="0" smtClean="0"/>
+          </a:p>
+          <a:p>
+            <a:pPr marL="285750" indent="-285750">
+              <a:buFont typeface="Arial" panose="020B0604020202020204" pitchFamily="34" charset="0"/>
+              <a:buChar char="•"/>
+            </a:pPr>
+            <a:endParaRPr lang="en-US" sz="2400" dirty="0"/>
+          </a:p>
+          <a:p>
+            <a:pPr marL="285750" indent="-285750">
+              <a:buFont typeface="Arial" panose="020B0604020202020204" pitchFamily="34" charset="0"/>
+              <a:buChar char="•"/>
+            </a:pPr>
+            <a:endParaRPr lang="en-US" sz="2400" dirty="0" smtClean="0"/>
+          </a:p>
+          <a:p>
+            <a:pPr marL="285750" indent="-285750">
+              <a:buFont typeface="Arial" panose="020B0604020202020204" pitchFamily="34" charset="0"/>
+              <a:buChar char="•"/>
+            </a:pPr>
+            <a:endParaRPr lang="en-US" sz="2400" dirty="0" smtClean="0"/>
+          </a:p>
+          <a:p>
+            <a:pPr marL="285750" indent="-285750">
+              <a:buFont typeface="Arial" panose="020B0604020202020204" pitchFamily="34" charset="0"/>
+              <a:buChar char="•"/>
+            </a:pPr>
+            <a:endParaRPr lang="en-US" sz="2400" dirty="0" smtClean="0"/>
+          </a:p>
+          <a:p>
+            <a:pPr marL="630238" lvl="2" indent="-285750"/>
+            <a:endParaRPr lang="en-US" sz="2200" dirty="0"/>
+          </a:p>
+          <a:p>
+            <a:pPr marL="285750" indent="-285750"/>
+            <a:endParaRPr lang="en-US" sz="2400" dirty="0"/>
+          </a:p>
+          <a:p>
+            <a:pPr marL="285750" indent="-285750">
+              <a:buFont typeface="Arial" panose="020B0604020202020204" pitchFamily="34" charset="0"/>
+              <a:buChar char="•"/>
+            </a:pPr>
+            <a:endParaRPr lang="en-US" sz="2400" dirty="0" smtClean="0"/>
+          </a:p>
+        </p:txBody>
+      </p:sp>
+      <p:sp>
+        <p:nvSpPr>
+          <p:cNvPr id="2" name="Title 1"/>
+          <p:cNvSpPr>
+            <a:spLocks noGrp="1"/>
+          </p:cNvSpPr>
+          <p:nvPr>
+            <p:ph type="title"/>
+          </p:nvPr>
+        </p:nvSpPr>
+        <p:spPr/>
+        <p:txBody>
+          <a:bodyPr/>
+          <a:lstStyle/>
+          <a:p>
             <a:r>
               <a:rPr lang="en-US" dirty="0" smtClean="0"/>
-              <a:t>Server will control bulk of game logic</a:t>
-            </a:r>
-          </a:p>
-          <a:p>
-            <a:r>
-              <a:rPr lang="en-US" dirty="0" smtClean="0"/>
-              <a:t>Server will arbitrate collisions, actions, etc.</a:t>
-            </a:r>
-          </a:p>
-          <a:p>
-            <a:pPr marL="0" indent="0">
-              <a:buNone/>
-            </a:pPr>
-            <a:r>
-              <a:rPr lang="en-US" dirty="0" smtClean="0"/>
-              <a:t>Screen and sprite data to be “streamed” by server to C64 clients in real-time (20 Hz)</a:t>
-            </a:r>
-          </a:p>
-          <a:p>
-            <a:pPr marL="0" indent="0">
-              <a:buNone/>
-            </a:pPr>
-            <a:r>
-              <a:rPr lang="en-US" dirty="0" smtClean="0"/>
-              <a:t>Player inputs and location to be sent from C64 to server (20 Hz)</a:t>
-            </a:r>
-            <a:endParaRPr lang="en-US" dirty="0"/>
-          </a:p>
-        </p:txBody>
-      </p:sp>
-      <p:sp>
-        <p:nvSpPr>
-          <p:cNvPr id="2" name="Title 1"/>
-          <p:cNvSpPr>
-            <a:spLocks noGrp="1"/>
-          </p:cNvSpPr>
-          <p:nvPr>
-            <p:ph type="title"/>
-          </p:nvPr>
-        </p:nvSpPr>
-        <p:spPr/>
-        <p:txBody>
-          <a:bodyPr/>
-          <a:lstStyle/>
-          <a:p>
-            <a:r>
-              <a:rPr lang="en-US" dirty="0" smtClean="0"/>
-              <a:t>Technical Design Decisions</a:t>
+              <a:t>The Game:  Vortex 2  </a:t>
             </a:r>
             <a:endParaRPr lang="en-US" dirty="0"/>
           </a:p>
@@ -4956,7 +5822,7 @@
     </p:spTree>
     <p:extLst>
       <p:ext uri="{BB962C8B-B14F-4D97-AF65-F5344CB8AC3E}">
-        <p14:creationId xmlns:p14="http://schemas.microsoft.com/office/powerpoint/2010/main" val="988291545"/>
+        <p14:creationId xmlns:p14="http://schemas.microsoft.com/office/powerpoint/2010/main" val="1114331662"/>
       </p:ext>
     </p:extLst>
   </p:cSld>
@@ -5000,124 +5866,147 @@
             <p:ph sz="quarter" idx="13"/>
           </p:nvPr>
         </p:nvSpPr>
-        <p:spPr/>
+        <p:spPr>
+          <a:xfrm>
+            <a:off x="352426" y="1463040"/>
+            <a:ext cx="8540054" cy="4724400"/>
+          </a:xfrm>
+        </p:spPr>
         <p:txBody>
           <a:bodyPr>
             <a:normAutofit/>
           </a:bodyPr>
           <a:lstStyle/>
           <a:p>
+            <a:pPr marL="285750" indent="-285750">
+              <a:buFont typeface="Arial" panose="020B0604020202020204" pitchFamily="34" charset="0"/>
+              <a:buChar char="•"/>
+            </a:pPr>
+            <a:r>
+              <a:rPr lang="en-US" sz="2400" dirty="0" smtClean="0"/>
+              <a:t>First draft of design documents written</a:t>
+            </a:r>
+          </a:p>
+          <a:p>
+            <a:pPr marL="285750" indent="-285750">
+              <a:buFont typeface="Arial" panose="020B0604020202020204" pitchFamily="34" charset="0"/>
+              <a:buChar char="•"/>
+            </a:pPr>
+            <a:r>
+              <a:rPr lang="en-US" sz="2400" dirty="0" smtClean="0"/>
+              <a:t>Server is in place  </a:t>
+            </a:r>
+            <a:r>
+              <a:rPr lang="en-US" sz="2400" dirty="0" smtClean="0"/>
+              <a:t>(VPS running </a:t>
+            </a:r>
+            <a:r>
+              <a:rPr lang="en-US" sz="2400" dirty="0" smtClean="0"/>
+              <a:t>Ubuntu Server </a:t>
+            </a:r>
+            <a:r>
+              <a:rPr lang="en-US" sz="2400" dirty="0" smtClean="0"/>
+              <a:t>12.04</a:t>
+            </a:r>
+            <a:r>
+              <a:rPr lang="en-US" sz="2400" dirty="0" smtClean="0"/>
+              <a:t>)</a:t>
+            </a:r>
+          </a:p>
+          <a:p>
+            <a:pPr marL="285750" indent="-285750">
+              <a:buFont typeface="Arial" panose="020B0604020202020204" pitchFamily="34" charset="0"/>
+              <a:buChar char="•"/>
+            </a:pPr>
+            <a:r>
+              <a:rPr lang="en-US" sz="2400" dirty="0" smtClean="0"/>
+              <a:t>Proof-of-concept Server code running</a:t>
+            </a:r>
+          </a:p>
+          <a:p>
+            <a:pPr marL="285750" indent="-285750">
+              <a:buFont typeface="Arial" panose="020B0604020202020204" pitchFamily="34" charset="0"/>
+              <a:buChar char="•"/>
+            </a:pPr>
+            <a:r>
+              <a:rPr lang="en-US" sz="2400" dirty="0" smtClean="0"/>
+              <a:t>Proof-of-concept </a:t>
+            </a:r>
+            <a:r>
+              <a:rPr lang="en-US" sz="2400" dirty="0"/>
+              <a:t>Client code </a:t>
+            </a:r>
+            <a:r>
+              <a:rPr lang="en-US" sz="2400" dirty="0" smtClean="0"/>
+              <a:t>working</a:t>
+            </a:r>
+            <a:endParaRPr lang="en-US" sz="2400" dirty="0"/>
+          </a:p>
+          <a:p>
+            <a:pPr marL="630238" lvl="2" indent="-285750"/>
+            <a:r>
+              <a:rPr lang="en-US" sz="2200" dirty="0"/>
+              <a:t>Fly around and explore</a:t>
+            </a:r>
+          </a:p>
+          <a:p>
+            <a:pPr marL="630238" lvl="2" indent="-285750"/>
+            <a:r>
+              <a:rPr lang="en-US" sz="2200" dirty="0"/>
+              <a:t>Enemy ships will </a:t>
+            </a:r>
+            <a:r>
+              <a:rPr lang="en-US" sz="2200" dirty="0" smtClean="0"/>
+              <a:t>chase you</a:t>
+            </a:r>
+            <a:endParaRPr lang="en-US" sz="2200" dirty="0"/>
+          </a:p>
+          <a:p>
+            <a:pPr marL="285750" indent="-285750">
+              <a:buFont typeface="Arial" panose="020B0604020202020204" pitchFamily="34" charset="0"/>
+              <a:buChar char="•"/>
+            </a:pPr>
+            <a:r>
+              <a:rPr lang="en-US" sz="2400" dirty="0" smtClean="0"/>
+              <a:t>Initial version of graphics and charset ready</a:t>
+            </a:r>
+            <a:endParaRPr lang="en-US" sz="2400" dirty="0"/>
+          </a:p>
+          <a:p>
+            <a:pPr marL="630238" lvl="2" indent="-285750"/>
+            <a:endParaRPr lang="en-US" sz="2200" dirty="0"/>
+          </a:p>
+          <a:p>
+            <a:pPr marL="285750" indent="-285750"/>
+            <a:endParaRPr lang="en-US" sz="2400" dirty="0"/>
+          </a:p>
+          <a:p>
+            <a:pPr marL="285750" indent="-285750">
+              <a:buFont typeface="Arial" panose="020B0604020202020204" pitchFamily="34" charset="0"/>
+              <a:buChar char="•"/>
+            </a:pPr>
+            <a:endParaRPr lang="en-US" sz="2400" dirty="0" smtClean="0"/>
+          </a:p>
+        </p:txBody>
+      </p:sp>
+      <p:sp>
+        <p:nvSpPr>
+          <p:cNvPr id="2" name="Title 1"/>
+          <p:cNvSpPr>
+            <a:spLocks noGrp="1"/>
+          </p:cNvSpPr>
+          <p:nvPr>
+            <p:ph type="title"/>
+          </p:nvPr>
+        </p:nvSpPr>
+        <p:spPr/>
+        <p:txBody>
+          <a:bodyPr/>
+          <a:lstStyle/>
+          <a:p>
             <a:r>
               <a:rPr lang="en-US" dirty="0" smtClean="0"/>
-              <a:t>Leif </a:t>
-            </a:r>
-            <a:r>
-              <a:rPr lang="en-US" dirty="0" err="1" smtClean="0"/>
-              <a:t>Bloomquist</a:t>
-            </a:r>
-            <a:r>
-              <a:rPr lang="en-US" dirty="0" smtClean="0"/>
-              <a:t> (Concept, Direction, Networking, Server code)</a:t>
-            </a:r>
-          </a:p>
-          <a:p>
-            <a:r>
-              <a:rPr lang="en-US" dirty="0" smtClean="0"/>
-              <a:t>Saul Cross (Graphics)</a:t>
-            </a:r>
-          </a:p>
-          <a:p>
-            <a:r>
-              <a:rPr lang="en-US" dirty="0" smtClean="0"/>
-              <a:t>Bryce Wilson  (Client code)</a:t>
-            </a:r>
-          </a:p>
-          <a:p>
-            <a:r>
-              <a:rPr lang="en-US" dirty="0" smtClean="0"/>
-              <a:t>Robin </a:t>
-            </a:r>
-            <a:r>
-              <a:rPr lang="en-US" dirty="0" err="1" smtClean="0"/>
-              <a:t>Harbron</a:t>
-            </a:r>
-            <a:r>
-              <a:rPr lang="en-US" dirty="0" smtClean="0"/>
-              <a:t>  (A bit of everything)</a:t>
-            </a:r>
-          </a:p>
-          <a:p>
-            <a:endParaRPr lang="en-US" dirty="0"/>
-          </a:p>
-          <a:p>
-            <a:r>
-              <a:rPr lang="en-US" dirty="0" smtClean="0"/>
-              <a:t>Support:</a:t>
-            </a:r>
-          </a:p>
-          <a:p>
-            <a:r>
-              <a:rPr lang="en-US" dirty="0" err="1" smtClean="0"/>
-              <a:t>Jonno</a:t>
-            </a:r>
-            <a:r>
-              <a:rPr lang="en-US" dirty="0" smtClean="0"/>
-              <a:t> </a:t>
-            </a:r>
-            <a:r>
-              <a:rPr lang="en-US" dirty="0" err="1" smtClean="0"/>
-              <a:t>Downes</a:t>
-            </a:r>
-            <a:r>
-              <a:rPr lang="en-US" dirty="0" smtClean="0"/>
-              <a:t> (IP65 networking code)</a:t>
-            </a:r>
-          </a:p>
-          <a:p>
-            <a:r>
-              <a:rPr lang="en-US" dirty="0"/>
-              <a:t>Dan </a:t>
-            </a:r>
-            <a:r>
-              <a:rPr lang="en-US" dirty="0" err="1" smtClean="0"/>
-              <a:t>Roganti</a:t>
-            </a:r>
-            <a:r>
-              <a:rPr lang="en-US" dirty="0" smtClean="0"/>
-              <a:t> (</a:t>
-            </a:r>
-            <a:r>
-              <a:rPr lang="en-US" dirty="0" err="1" smtClean="0"/>
-              <a:t>Playtesting</a:t>
-            </a:r>
-            <a:r>
-              <a:rPr lang="en-US" dirty="0" smtClean="0"/>
-              <a:t>)</a:t>
-            </a:r>
-          </a:p>
-          <a:p>
-            <a:endParaRPr lang="en-US" dirty="0"/>
-          </a:p>
-        </p:txBody>
-      </p:sp>
-      <p:sp>
-        <p:nvSpPr>
-          <p:cNvPr id="2" name="Title 1"/>
-          <p:cNvSpPr>
-            <a:spLocks noGrp="1"/>
-          </p:cNvSpPr>
-          <p:nvPr>
-            <p:ph type="title"/>
-          </p:nvPr>
-        </p:nvSpPr>
-        <p:spPr/>
-        <p:txBody>
-          <a:bodyPr/>
-          <a:lstStyle/>
-          <a:p>
-            <a:r>
-              <a:rPr lang="en-US" dirty="0" smtClean="0"/>
-              <a:t>The Team</a:t>
+              <a:t>Status</a:t>
             </a:r>
             <a:endParaRPr lang="en-US" dirty="0"/>
           </a:p>
@@ -5126,7 +6015,180 @@
     </p:spTree>
     <p:extLst>
       <p:ext uri="{BB962C8B-B14F-4D97-AF65-F5344CB8AC3E}">
-        <p14:creationId xmlns:p14="http://schemas.microsoft.com/office/powerpoint/2010/main" val="1513897396"/>
+        <p14:creationId xmlns:p14="http://schemas.microsoft.com/office/powerpoint/2010/main" val="2070494805"/>
+      </p:ext>
+    </p:extLst>
+  </p:cSld>
+  <p:clrMapOvr>
+    <a:masterClrMapping/>
+  </p:clrMapOvr>
+  <p:timing>
+    <p:tnLst>
+      <p:par>
+        <p:cTn id="1" dur="indefinite" restart="never" nodeType="tmRoot"/>
+      </p:par>
+    </p:tnLst>
+  </p:timing>
+</p:sld>
+</file>
+
+<file path=ppt/slides/slide9.xml><?xml version="1.0" encoding="utf-8"?>
+<p:sld xmlns:a="http://schemas.openxmlformats.org/drawingml/2006/main" xmlns:r="http://schemas.openxmlformats.org/officeDocument/2006/relationships" xmlns:p="http://schemas.openxmlformats.org/presentationml/2006/main">
+  <p:cSld>
+    <p:spTree>
+      <p:nvGrpSpPr>
+        <p:cNvPr id="1" name=""/>
+        <p:cNvGrpSpPr/>
+        <p:nvPr/>
+      </p:nvGrpSpPr>
+      <p:grpSpPr>
+        <a:xfrm>
+          <a:off x="0" y="0"/>
+          <a:ext cx="0" cy="0"/>
+          <a:chOff x="0" y="0"/>
+          <a:chExt cx="0" cy="0"/>
+        </a:xfrm>
+      </p:grpSpPr>
+      <p:sp>
+        <p:nvSpPr>
+          <p:cNvPr id="3" name="Content Placeholder 2"/>
+          <p:cNvSpPr>
+            <a:spLocks noGrp="1"/>
+          </p:cNvSpPr>
+          <p:nvPr>
+            <p:ph sz="quarter" idx="13"/>
+          </p:nvPr>
+        </p:nvSpPr>
+        <p:spPr>
+          <a:xfrm>
+            <a:off x="251520" y="1512912"/>
+            <a:ext cx="8856984" cy="4724400"/>
+          </a:xfrm>
+        </p:spPr>
+        <p:txBody>
+          <a:bodyPr>
+            <a:normAutofit/>
+          </a:bodyPr>
+          <a:lstStyle/>
+          <a:p>
+            <a:pPr marL="285750" indent="-285750">
+              <a:buFont typeface="Arial" panose="020B0604020202020204" pitchFamily="34" charset="0"/>
+              <a:buChar char="•"/>
+            </a:pPr>
+            <a:r>
+              <a:rPr lang="en-US" sz="2400" dirty="0" smtClean="0"/>
+              <a:t>Server will control bulk of game logic</a:t>
+            </a:r>
+          </a:p>
+          <a:p>
+            <a:pPr marL="285750" indent="-285750">
+              <a:buFont typeface="Arial" panose="020B0604020202020204" pitchFamily="34" charset="0"/>
+              <a:buChar char="•"/>
+            </a:pPr>
+            <a:r>
+              <a:rPr lang="en-US" sz="2400" dirty="0" smtClean="0"/>
+              <a:t>Server will arbitrate collisions, actions, etc.</a:t>
+            </a:r>
+          </a:p>
+          <a:p>
+            <a:pPr marL="285750" indent="-285750">
+              <a:buFont typeface="Arial" panose="020B0604020202020204" pitchFamily="34" charset="0"/>
+              <a:buChar char="•"/>
+            </a:pPr>
+            <a:r>
+              <a:rPr lang="en-US" sz="2400" dirty="0" smtClean="0"/>
+              <a:t>Screen and sprite location data to be “streamed” by server to C64 clients in real-time (20 Hz)</a:t>
+            </a:r>
+          </a:p>
+          <a:p>
+            <a:pPr marL="285750" indent="-285750">
+              <a:buFont typeface="Arial" panose="020B0604020202020204" pitchFamily="34" charset="0"/>
+              <a:buChar char="•"/>
+            </a:pPr>
+            <a:r>
+              <a:rPr lang="en-US" sz="2400" dirty="0" smtClean="0"/>
+              <a:t>Player inputs and location to be sent from C64 to server (20 Hz)</a:t>
+            </a:r>
+          </a:p>
+          <a:p>
+            <a:pPr marL="285750" indent="-285750">
+              <a:buFont typeface="Arial" panose="020B0604020202020204" pitchFamily="34" charset="0"/>
+              <a:buChar char="•"/>
+            </a:pPr>
+            <a:r>
+              <a:rPr lang="en-US" sz="2400" dirty="0" smtClean="0"/>
+              <a:t>Server language: Java 7</a:t>
+            </a:r>
+          </a:p>
+          <a:p>
+            <a:pPr marL="285750" indent="-285750">
+              <a:buFont typeface="Arial" panose="020B0604020202020204" pitchFamily="34" charset="0"/>
+              <a:buChar char="•"/>
+            </a:pPr>
+            <a:r>
+              <a:rPr lang="en-US" sz="2400" dirty="0" smtClean="0"/>
+              <a:t>Client </a:t>
+            </a:r>
+            <a:r>
+              <a:rPr lang="en-US" sz="2400" dirty="0"/>
+              <a:t>language: </a:t>
+            </a:r>
+            <a:r>
+              <a:rPr lang="en-US" sz="2400" dirty="0" smtClean="0"/>
+              <a:t>ca65 </a:t>
+            </a:r>
+            <a:r>
+              <a:rPr lang="en-US" sz="2400" dirty="0" smtClean="0"/>
+              <a:t>cross-assembler</a:t>
+            </a:r>
+          </a:p>
+          <a:p>
+            <a:pPr marL="285750" indent="-285750">
+              <a:buFont typeface="Arial" panose="020B0604020202020204" pitchFamily="34" charset="0"/>
+              <a:buChar char="•"/>
+            </a:pPr>
+            <a:r>
+              <a:rPr lang="en-US" sz="2400" dirty="0" smtClean="0"/>
+              <a:t>IP65 library</a:t>
+            </a:r>
+            <a:endParaRPr lang="en-US" sz="2400" dirty="0"/>
+          </a:p>
+          <a:p>
+            <a:pPr marL="285750" indent="-285750">
+              <a:buFont typeface="Arial" panose="020B0604020202020204" pitchFamily="34" charset="0"/>
+              <a:buChar char="•"/>
+            </a:pPr>
+            <a:endParaRPr lang="en-US" sz="2400" dirty="0"/>
+          </a:p>
+        </p:txBody>
+      </p:sp>
+      <p:sp>
+        <p:nvSpPr>
+          <p:cNvPr id="2" name="Title 1"/>
+          <p:cNvSpPr>
+            <a:spLocks noGrp="1"/>
+          </p:cNvSpPr>
+          <p:nvPr>
+            <p:ph type="title"/>
+          </p:nvPr>
+        </p:nvSpPr>
+        <p:spPr/>
+        <p:txBody>
+          <a:bodyPr/>
+          <a:lstStyle/>
+          <a:p>
+            <a:r>
+              <a:rPr lang="en-US" dirty="0" smtClean="0"/>
+              <a:t>Technical Design Decisions</a:t>
+            </a:r>
+            <a:endParaRPr lang="en-US" dirty="0"/>
+          </a:p>
+        </p:txBody>
+      </p:sp>
+    </p:spTree>
+    <p:extLst>
+      <p:ext uri="{BB962C8B-B14F-4D97-AF65-F5344CB8AC3E}">
+        <p14:creationId xmlns:p14="http://schemas.microsoft.com/office/powerpoint/2010/main" val="988291545"/>
       </p:ext>
     </p:extLst>
   </p:cSld>

</xml_diff>